<commit_message>
Update component class diagrams (#152)
* Update Model class diagram

* Update Storage class diagram

* Update UI class diagram
</commit_message>
<xml_diff>
--- a/docs/diagrams/StorageComponentClassDiagram.pptx
+++ b/docs/diagrams/StorageComponentClassDiagram.pptx
@@ -208,7 +208,7 @@
           <a:p>
             <a:fld id="{F5CC4B3F-88C1-4FFA-B1B6-F41C21DC6924}" type="datetimeFigureOut">
               <a:rPr lang="en-US" smtClean="0"/>
-              <a:t>10/25/18</a:t>
+              <a:t>10/30/2018</a:t>
             </a:fld>
             <a:endParaRPr lang="en-US"/>
           </a:p>
@@ -654,7 +654,7 @@
           <a:p>
             <a:fld id="{78C97017-6FC3-485B-9764-EAC9E56C1D49}" type="datetimeFigureOut">
               <a:rPr lang="en-US" smtClean="0"/>
-              <a:t>10/25/18</a:t>
+              <a:t>10/30/2018</a:t>
             </a:fld>
             <a:endParaRPr lang="en-US"/>
           </a:p>
@@ -822,7 +822,7 @@
           <a:p>
             <a:fld id="{78C97017-6FC3-485B-9764-EAC9E56C1D49}" type="datetimeFigureOut">
               <a:rPr lang="en-US" smtClean="0"/>
-              <a:t>10/25/18</a:t>
+              <a:t>10/30/2018</a:t>
             </a:fld>
             <a:endParaRPr lang="en-US"/>
           </a:p>
@@ -1000,7 +1000,7 @@
           <a:p>
             <a:fld id="{78C97017-6FC3-485B-9764-EAC9E56C1D49}" type="datetimeFigureOut">
               <a:rPr lang="en-US" smtClean="0"/>
-              <a:t>10/25/18</a:t>
+              <a:t>10/30/2018</a:t>
             </a:fld>
             <a:endParaRPr lang="en-US"/>
           </a:p>
@@ -1168,7 +1168,7 @@
           <a:p>
             <a:fld id="{78C97017-6FC3-485B-9764-EAC9E56C1D49}" type="datetimeFigureOut">
               <a:rPr lang="en-US" smtClean="0"/>
-              <a:t>10/25/18</a:t>
+              <a:t>10/30/2018</a:t>
             </a:fld>
             <a:endParaRPr lang="en-US"/>
           </a:p>
@@ -1413,7 +1413,7 @@
           <a:p>
             <a:fld id="{78C97017-6FC3-485B-9764-EAC9E56C1D49}" type="datetimeFigureOut">
               <a:rPr lang="en-US" smtClean="0"/>
-              <a:t>10/25/18</a:t>
+              <a:t>10/30/2018</a:t>
             </a:fld>
             <a:endParaRPr lang="en-US"/>
           </a:p>
@@ -1698,7 +1698,7 @@
           <a:p>
             <a:fld id="{78C97017-6FC3-485B-9764-EAC9E56C1D49}" type="datetimeFigureOut">
               <a:rPr lang="en-US" smtClean="0"/>
-              <a:t>10/25/18</a:t>
+              <a:t>10/30/2018</a:t>
             </a:fld>
             <a:endParaRPr lang="en-US"/>
           </a:p>
@@ -2117,7 +2117,7 @@
           <a:p>
             <a:fld id="{78C97017-6FC3-485B-9764-EAC9E56C1D49}" type="datetimeFigureOut">
               <a:rPr lang="en-US" smtClean="0"/>
-              <a:t>10/25/18</a:t>
+              <a:t>10/30/2018</a:t>
             </a:fld>
             <a:endParaRPr lang="en-US"/>
           </a:p>
@@ -2234,7 +2234,7 @@
           <a:p>
             <a:fld id="{78C97017-6FC3-485B-9764-EAC9E56C1D49}" type="datetimeFigureOut">
               <a:rPr lang="en-US" smtClean="0"/>
-              <a:t>10/25/18</a:t>
+              <a:t>10/30/2018</a:t>
             </a:fld>
             <a:endParaRPr lang="en-US"/>
           </a:p>
@@ -2329,7 +2329,7 @@
           <a:p>
             <a:fld id="{78C97017-6FC3-485B-9764-EAC9E56C1D49}" type="datetimeFigureOut">
               <a:rPr lang="en-US" smtClean="0"/>
-              <a:t>10/25/18</a:t>
+              <a:t>10/30/2018</a:t>
             </a:fld>
             <a:endParaRPr lang="en-US"/>
           </a:p>
@@ -2604,7 +2604,7 @@
           <a:p>
             <a:fld id="{78C97017-6FC3-485B-9764-EAC9E56C1D49}" type="datetimeFigureOut">
               <a:rPr lang="en-US" smtClean="0"/>
-              <a:t>10/25/18</a:t>
+              <a:t>10/30/2018</a:t>
             </a:fld>
             <a:endParaRPr lang="en-US"/>
           </a:p>
@@ -2856,7 +2856,7 @@
           <a:p>
             <a:fld id="{78C97017-6FC3-485B-9764-EAC9E56C1D49}" type="datetimeFigureOut">
               <a:rPr lang="en-US" smtClean="0"/>
-              <a:t>10/25/18</a:t>
+              <a:t>10/30/2018</a:t>
             </a:fld>
             <a:endParaRPr lang="en-US"/>
           </a:p>
@@ -3067,7 +3067,7 @@
           <a:p>
             <a:fld id="{78C97017-6FC3-485B-9764-EAC9E56C1D49}" type="datetimeFigureOut">
               <a:rPr lang="en-US" smtClean="0"/>
-              <a:t>10/25/18</a:t>
+              <a:t>10/30/2018</a:t>
             </a:fld>
             <a:endParaRPr lang="en-US"/>
           </a:p>
@@ -3450,8 +3450,8 @@
         </p:nvSpPr>
         <p:spPr>
           <a:xfrm>
-            <a:off x="1119865" y="2086382"/>
-            <a:ext cx="7871735" cy="1723618"/>
+            <a:off x="636132" y="1828800"/>
+            <a:ext cx="7871735" cy="1972620"/>
           </a:xfrm>
           <a:prstGeom prst="roundRect">
             <a:avLst>
@@ -3488,7 +3488,7 @@
           <a:lstStyle/>
           <a:p>
             <a:r>
-              <a:rPr lang="en-US" sz="1200" b="1" dirty="0">
+              <a:rPr lang="en-US" sz="1200" b="1">
                 <a:solidFill>
                   <a:schemeClr val="accent6">
                     <a:lumMod val="75000"/>
@@ -3515,7 +3515,7 @@
         </p:nvSpPr>
         <p:spPr>
           <a:xfrm>
-            <a:off x="2877180" y="3158440"/>
+            <a:off x="2393447" y="2900858"/>
             <a:ext cx="1323049" cy="346760"/>
           </a:xfrm>
           <a:prstGeom prst="rect">
@@ -3555,7 +3555,7 @@
           <a:p>
             <a:pPr algn="ctr"/>
             <a:r>
-              <a:rPr lang="en-US" sz="1050" dirty="0">
+              <a:rPr lang="en-US" sz="1050">
                 <a:solidFill>
                   <a:schemeClr val="bg1"/>
                 </a:solidFill>
@@ -3563,14 +3563,14 @@
               <a:t>&lt;&lt;interface&gt;&gt;</a:t>
             </a:r>
             <a:br>
-              <a:rPr lang="en-US" sz="1050" dirty="0">
+              <a:rPr lang="en-US" sz="1050">
                 <a:solidFill>
                   <a:schemeClr val="bg1"/>
                 </a:solidFill>
               </a:rPr>
             </a:br>
             <a:r>
-              <a:rPr lang="en-US" sz="1050" dirty="0" err="1">
+              <a:rPr lang="en-US" sz="1050">
                 <a:solidFill>
                   <a:schemeClr val="bg1"/>
                 </a:solidFill>
@@ -3593,7 +3593,7 @@
         </p:nvSpPr>
         <p:spPr>
           <a:xfrm rot="16200000">
-            <a:off x="1683963" y="2868687"/>
+            <a:off x="1200230" y="2611105"/>
             <a:ext cx="1093635" cy="346760"/>
           </a:xfrm>
           <a:prstGeom prst="rect">
@@ -3633,7 +3633,7 @@
           <a:p>
             <a:pPr algn="ctr"/>
             <a:r>
-              <a:rPr lang="en-US" sz="1050" dirty="0" err="1">
+              <a:rPr lang="en-US" sz="1050">
                 <a:solidFill>
                   <a:schemeClr val="bg1"/>
                 </a:solidFill>
@@ -3656,7 +3656,7 @@
         </p:nvSpPr>
         <p:spPr>
           <a:xfrm rot="16200000">
-            <a:off x="956202" y="2861202"/>
+            <a:off x="472469" y="2603620"/>
             <a:ext cx="1093635" cy="346760"/>
           </a:xfrm>
           <a:prstGeom prst="rect">
@@ -3696,7 +3696,7 @@
           <a:p>
             <a:pPr algn="ctr"/>
             <a:r>
-              <a:rPr lang="en-US" sz="1050" dirty="0">
+              <a:rPr lang="en-US" sz="1050">
                 <a:solidFill>
                   <a:schemeClr val="bg1"/>
                 </a:solidFill>
@@ -3707,7 +3707,7 @@
           <a:p>
             <a:pPr algn="ctr"/>
             <a:r>
-              <a:rPr lang="en-US" sz="1050" dirty="0">
+              <a:rPr lang="en-US" sz="1050">
                 <a:solidFill>
                   <a:schemeClr val="bg1"/>
                 </a:solidFill>
@@ -3730,7 +3730,7 @@
         </p:nvSpPr>
         <p:spPr>
           <a:xfrm rot="16200000">
-            <a:off x="1626910" y="2952291"/>
+            <a:off x="1143177" y="2694709"/>
             <a:ext cx="270504" cy="175523"/>
           </a:xfrm>
           <a:prstGeom prst="triangle">
@@ -3788,7 +3788,7 @@
         </p:nvCxnSpPr>
         <p:spPr>
           <a:xfrm>
-            <a:off x="2656370" y="3326536"/>
+            <a:off x="2172637" y="3068954"/>
             <a:ext cx="220810" cy="5284"/>
           </a:xfrm>
           <a:prstGeom prst="straightConnector1">
@@ -3828,7 +3828,7 @@
         </p:nvCxnSpPr>
         <p:spPr>
           <a:xfrm>
-            <a:off x="910091" y="3040053"/>
+            <a:off x="426358" y="2782471"/>
             <a:ext cx="419548" cy="2860"/>
           </a:xfrm>
           <a:prstGeom prst="bentConnector3">
@@ -3873,7 +3873,7 @@
         </p:nvCxnSpPr>
         <p:spPr>
           <a:xfrm flipV="1">
-            <a:off x="1849924" y="3040052"/>
+            <a:off x="1366191" y="2782470"/>
             <a:ext cx="216105" cy="1"/>
           </a:xfrm>
           <a:prstGeom prst="line">
@@ -3914,7 +3914,7 @@
         </p:nvSpPr>
         <p:spPr>
           <a:xfrm>
-            <a:off x="2420322" y="3239846"/>
+            <a:off x="1936589" y="2982264"/>
             <a:ext cx="236048" cy="173380"/>
           </a:xfrm>
           <a:prstGeom prst="flowChartDecision">
@@ -3968,7 +3968,7 @@
         </p:nvCxnSpPr>
         <p:spPr>
           <a:xfrm flipV="1">
-            <a:off x="4398041" y="3331820"/>
+            <a:off x="3914308" y="3074238"/>
             <a:ext cx="223324" cy="1"/>
           </a:xfrm>
           <a:prstGeom prst="bentConnector3">
@@ -4011,7 +4011,7 @@
         </p:nvSpPr>
         <p:spPr>
           <a:xfrm rot="5400000" flipV="1">
-            <a:off x="4175027" y="3244059"/>
+            <a:off x="3691294" y="2986477"/>
             <a:ext cx="270504" cy="175523"/>
           </a:xfrm>
           <a:prstGeom prst="triangle">
@@ -4069,7 +4069,7 @@
         </p:nvCxnSpPr>
         <p:spPr>
           <a:xfrm>
-            <a:off x="5791200" y="3331820"/>
+            <a:off x="5307467" y="3074238"/>
             <a:ext cx="228600" cy="1970"/>
           </a:xfrm>
           <a:prstGeom prst="bentConnector3">
@@ -4112,7 +4112,7 @@
         </p:nvSpPr>
         <p:spPr>
           <a:xfrm>
-            <a:off x="4621365" y="3158440"/>
+            <a:off x="4137632" y="2900858"/>
             <a:ext cx="1169835" cy="346760"/>
           </a:xfrm>
           <a:prstGeom prst="rect">
@@ -4141,7 +4141,7 @@
           <a:p>
             <a:pPr algn="ctr"/>
             <a:r>
-              <a:rPr lang="en-US" sz="1050" b="1" dirty="0" err="1">
+              <a:rPr lang="en-US" sz="1050" b="1">
                 <a:solidFill>
                   <a:schemeClr val="accent6">
                     <a:lumMod val="75000"/>
@@ -4151,7 +4151,7 @@
               <a:t>XmlLoanBook</a:t>
             </a:r>
             <a:br>
-              <a:rPr lang="en-US" sz="1050" b="1" dirty="0">
+              <a:rPr lang="en-US" sz="1050" b="1">
                 <a:solidFill>
                   <a:schemeClr val="accent6">
                     <a:lumMod val="75000"/>
@@ -4160,7 +4160,7 @@
               </a:rPr>
             </a:br>
             <a:r>
-              <a:rPr lang="en-US" sz="1050" b="1" dirty="0">
+              <a:rPr lang="en-US" sz="1050" b="1">
                 <a:solidFill>
                   <a:schemeClr val="accent6">
                     <a:lumMod val="75000"/>
@@ -4187,7 +4187,7 @@
         </p:nvSpPr>
         <p:spPr>
           <a:xfrm>
-            <a:off x="2873943" y="2558040"/>
+            <a:off x="2390210" y="2300458"/>
             <a:ext cx="1323049" cy="346760"/>
           </a:xfrm>
           <a:prstGeom prst="rect">
@@ -4227,7 +4227,7 @@
           <a:p>
             <a:pPr algn="ctr"/>
             <a:r>
-              <a:rPr lang="en-US" sz="1050" dirty="0">
+              <a:rPr lang="en-US" sz="1050">
                 <a:solidFill>
                   <a:schemeClr val="bg1"/>
                 </a:solidFill>
@@ -4235,14 +4235,14 @@
               <a:t>&lt;&lt;interface&gt;&gt;</a:t>
             </a:r>
             <a:br>
-              <a:rPr lang="en-US" sz="1050" dirty="0">
+              <a:rPr lang="en-US" sz="1050">
                 <a:solidFill>
                   <a:schemeClr val="bg1"/>
                 </a:solidFill>
               </a:rPr>
             </a:br>
             <a:r>
-              <a:rPr lang="en-US" sz="1050" dirty="0" err="1">
+              <a:rPr lang="en-US" sz="1050">
                 <a:solidFill>
                   <a:schemeClr val="bg1"/>
                 </a:solidFill>
@@ -4268,7 +4268,7 @@
         </p:nvCxnSpPr>
         <p:spPr>
           <a:xfrm>
-            <a:off x="2653133" y="2726136"/>
+            <a:off x="2169400" y="2468554"/>
             <a:ext cx="220810" cy="5284"/>
           </a:xfrm>
           <a:prstGeom prst="straightConnector1">
@@ -4308,7 +4308,7 @@
         </p:nvSpPr>
         <p:spPr>
           <a:xfrm>
-            <a:off x="2417085" y="2639446"/>
+            <a:off x="1933352" y="2381864"/>
             <a:ext cx="236048" cy="173380"/>
           </a:xfrm>
           <a:prstGeom prst="flowChartDecision">
@@ -4362,7 +4362,7 @@
         </p:nvCxnSpPr>
         <p:spPr>
           <a:xfrm flipV="1">
-            <a:off x="4394804" y="2731420"/>
+            <a:off x="3911071" y="2473838"/>
             <a:ext cx="223324" cy="1"/>
           </a:xfrm>
           <a:prstGeom prst="bentConnector3">
@@ -4405,7 +4405,7 @@
         </p:nvSpPr>
         <p:spPr>
           <a:xfrm rot="5400000" flipV="1">
-            <a:off x="4171790" y="2643659"/>
+            <a:off x="3688057" y="2386077"/>
             <a:ext cx="270504" cy="175523"/>
           </a:xfrm>
           <a:prstGeom prst="triangle">
@@ -4460,7 +4460,7 @@
         </p:nvSpPr>
         <p:spPr>
           <a:xfrm>
-            <a:off x="4618128" y="2558040"/>
+            <a:off x="4134395" y="2300458"/>
             <a:ext cx="1093635" cy="346760"/>
           </a:xfrm>
           <a:prstGeom prst="rect">
@@ -4500,7 +4500,7 @@
           <a:p>
             <a:pPr algn="ctr"/>
             <a:r>
-              <a:rPr lang="en-US" sz="1050" dirty="0" err="1">
+              <a:rPr lang="en-US" sz="1050">
                 <a:solidFill>
                   <a:schemeClr val="bg1"/>
                 </a:solidFill>
@@ -4508,14 +4508,14 @@
               <a:t>JsonUserPrefs</a:t>
             </a:r>
             <a:br>
-              <a:rPr lang="en-US" sz="1050" dirty="0">
+              <a:rPr lang="en-US" sz="1050">
                 <a:solidFill>
                   <a:schemeClr val="bg1"/>
                 </a:solidFill>
               </a:rPr>
             </a:br>
             <a:r>
-              <a:rPr lang="en-US" sz="1050" dirty="0">
+              <a:rPr lang="en-US" sz="1050">
                 <a:solidFill>
                   <a:schemeClr val="bg1"/>
                 </a:solidFill>
@@ -4538,7 +4538,7 @@
         </p:nvSpPr>
         <p:spPr>
           <a:xfrm>
-            <a:off x="6019800" y="3160410"/>
+            <a:off x="5536067" y="2902828"/>
             <a:ext cx="1200707" cy="346760"/>
           </a:xfrm>
           <a:prstGeom prst="rect">
@@ -4567,7 +4567,7 @@
           <a:p>
             <a:pPr algn="ctr"/>
             <a:r>
-              <a:rPr lang="en-US" sz="1050" b="1" dirty="0" err="1">
+              <a:rPr lang="en-US" sz="1050" b="1">
                 <a:solidFill>
                   <a:schemeClr val="accent6">
                     <a:lumMod val="75000"/>
@@ -4577,7 +4577,7 @@
               <a:t>XmlSerializable</a:t>
             </a:r>
             <a:br>
-              <a:rPr lang="en-US" sz="1050" b="1" dirty="0">
+              <a:rPr lang="en-US" sz="1050" b="1">
                 <a:solidFill>
                   <a:schemeClr val="accent6">
                     <a:lumMod val="75000"/>
@@ -4586,7 +4586,7 @@
               </a:rPr>
             </a:br>
             <a:r>
-              <a:rPr lang="en-US" sz="1050" b="1" dirty="0" err="1">
+              <a:rPr lang="en-US" sz="1050" b="1">
                 <a:solidFill>
                   <a:schemeClr val="accent6">
                     <a:lumMod val="75000"/>
@@ -4616,7 +4616,7 @@
         </p:nvCxnSpPr>
         <p:spPr>
           <a:xfrm rot="5400000" flipH="1" flipV="1">
-            <a:off x="8077993" y="2992020"/>
+            <a:off x="7594260" y="2734438"/>
             <a:ext cx="335208" cy="12700"/>
           </a:xfrm>
           <a:prstGeom prst="bentConnector3">
@@ -4654,7 +4654,7 @@
         </p:nvSpPr>
         <p:spPr>
           <a:xfrm>
-            <a:off x="7615738" y="2477656"/>
+            <a:off x="7132005" y="2220074"/>
             <a:ext cx="1259718" cy="346760"/>
           </a:xfrm>
           <a:prstGeom prst="rect">
@@ -4683,7 +4683,7 @@
           <a:p>
             <a:pPr algn="ctr"/>
             <a:r>
-              <a:rPr lang="en-US" sz="1050" b="1" dirty="0" err="1">
+              <a:rPr lang="en-US" sz="1050" b="1">
                 <a:solidFill>
                   <a:schemeClr val="accent6">
                     <a:lumMod val="75000"/>
@@ -4710,7 +4710,7 @@
         </p:nvSpPr>
         <p:spPr>
           <a:xfrm>
-            <a:off x="7615738" y="3159624"/>
+            <a:off x="7132005" y="2902042"/>
             <a:ext cx="1259718" cy="346760"/>
           </a:xfrm>
           <a:prstGeom prst="rect">
@@ -4739,7 +4739,7 @@
           <a:p>
             <a:pPr algn="ctr"/>
             <a:r>
-              <a:rPr lang="en-US" sz="1050" b="1" dirty="0" err="1">
+              <a:rPr lang="en-US" sz="1050" b="1">
                 <a:solidFill>
                   <a:schemeClr val="accent6">
                     <a:lumMod val="75000"/>
@@ -4769,8 +4769,118 @@
         </p:nvCxnSpPr>
         <p:spPr>
           <a:xfrm flipV="1">
-            <a:off x="7220507" y="3333004"/>
+            <a:off x="6736774" y="3075422"/>
             <a:ext cx="395231" cy="786"/>
+          </a:xfrm>
+          <a:prstGeom prst="bentConnector3">
+            <a:avLst>
+              <a:gd name="adj1" fmla="val 50000"/>
+            </a:avLst>
+          </a:prstGeom>
+          <a:ln w="19050">
+            <a:prstDash val="sysDot"/>
+            <a:headEnd type="none" w="med" len="med"/>
+            <a:tailEnd type="arrow" w="med" len="med"/>
+          </a:ln>
+          <a:effectLst/>
+        </p:spPr>
+        <p:style>
+          <a:lnRef idx="1">
+            <a:schemeClr val="accent6"/>
+          </a:lnRef>
+          <a:fillRef idx="2">
+            <a:schemeClr val="accent6"/>
+          </a:fillRef>
+          <a:effectRef idx="1">
+            <a:schemeClr val="accent6"/>
+          </a:effectRef>
+          <a:fontRef idx="minor">
+            <a:schemeClr val="dk1"/>
+          </a:fontRef>
+        </p:style>
+      </p:cxnSp>
+      <p:sp>
+        <p:nvSpPr>
+          <p:cNvPr id="26" name="Rectangle 8">
+            <a:extLst>
+              <a:ext uri="{FF2B5EF4-FFF2-40B4-BE49-F238E27FC236}">
+                <a16:creationId xmlns:a16="http://schemas.microsoft.com/office/drawing/2014/main" id="{E9754083-367E-47B4-AFFC-6D1F9F66A962}"/>
+              </a:ext>
+            </a:extLst>
+          </p:cNvPr>
+          <p:cNvSpPr/>
+          <p:nvPr/>
+        </p:nvSpPr>
+        <p:spPr>
+          <a:xfrm>
+            <a:off x="7125655" y="3313527"/>
+            <a:ext cx="1259718" cy="346760"/>
+          </a:xfrm>
+          <a:prstGeom prst="rect">
+            <a:avLst/>
+          </a:prstGeom>
+          <a:ln w="19050"/>
+          <a:effectLst/>
+        </p:spPr>
+        <p:style>
+          <a:lnRef idx="1">
+            <a:schemeClr val="accent6"/>
+          </a:lnRef>
+          <a:fillRef idx="2">
+            <a:schemeClr val="accent6"/>
+          </a:fillRef>
+          <a:effectRef idx="1">
+            <a:schemeClr val="accent6"/>
+          </a:effectRef>
+          <a:fontRef idx="minor">
+            <a:schemeClr val="dk1"/>
+          </a:fontRef>
+        </p:style>
+        <p:txBody>
+          <a:bodyPr rtlCol="0" anchor="ctr"/>
+          <a:lstStyle/>
+          <a:p>
+            <a:pPr algn="ctr"/>
+            <a:r>
+              <a:rPr lang="en-US" sz="1050" b="1" dirty="0" err="1">
+                <a:solidFill>
+                  <a:schemeClr val="accent6">
+                    <a:lumMod val="75000"/>
+                  </a:schemeClr>
+                </a:solidFill>
+              </a:rPr>
+              <a:t>XmlAdaptedBike</a:t>
+            </a:r>
+            <a:endParaRPr lang="en-SG" sz="1050" b="1" dirty="0">
+              <a:solidFill>
+                <a:schemeClr val="accent6">
+                  <a:lumMod val="75000"/>
+                </a:schemeClr>
+              </a:solidFill>
+            </a:endParaRPr>
+          </a:p>
+        </p:txBody>
+      </p:sp>
+      <p:cxnSp>
+        <p:nvCxnSpPr>
+          <p:cNvPr id="27" name="Elbow Connector 122">
+            <a:extLst>
+              <a:ext uri="{FF2B5EF4-FFF2-40B4-BE49-F238E27FC236}">
+                <a16:creationId xmlns:a16="http://schemas.microsoft.com/office/drawing/2014/main" id="{FC86E9E8-FA25-413D-B7D9-724DBD7AE8ED}"/>
+              </a:ext>
+            </a:extLst>
+          </p:cNvPr>
+          <p:cNvCxnSpPr>
+            <a:cxnSpLocks/>
+            <a:stCxn id="66" idx="3"/>
+            <a:endCxn id="26" idx="1"/>
+          </p:cNvCxnSpPr>
+          <p:nvPr/>
+        </p:nvCxnSpPr>
+        <p:spPr>
+          <a:xfrm>
+            <a:off x="6736774" y="3076208"/>
+            <a:ext cx="388881" cy="410699"/>
           </a:xfrm>
           <a:prstGeom prst="bentConnector3">
             <a:avLst>

</xml_diff>

<commit_message>
Add Irham's PPP (#280)
</commit_message>
<xml_diff>
--- a/docs/diagrams/StorageComponentClassDiagram.pptx
+++ b/docs/diagrams/StorageComponentClassDiagram.pptx
@@ -208,7 +208,7 @@
           <a:p>
             <a:fld id="{F5CC4B3F-88C1-4FFA-B1B6-F41C21DC6924}" type="datetimeFigureOut">
               <a:rPr lang="en-US" smtClean="0"/>
-              <a:t>10/30/2018</a:t>
+              <a:t>11/12/2018</a:t>
             </a:fld>
             <a:endParaRPr lang="en-US"/>
           </a:p>
@@ -654,7 +654,7 @@
           <a:p>
             <a:fld id="{78C97017-6FC3-485B-9764-EAC9E56C1D49}" type="datetimeFigureOut">
               <a:rPr lang="en-US" smtClean="0"/>
-              <a:t>10/30/2018</a:t>
+              <a:t>11/12/2018</a:t>
             </a:fld>
             <a:endParaRPr lang="en-US"/>
           </a:p>
@@ -822,7 +822,7 @@
           <a:p>
             <a:fld id="{78C97017-6FC3-485B-9764-EAC9E56C1D49}" type="datetimeFigureOut">
               <a:rPr lang="en-US" smtClean="0"/>
-              <a:t>10/30/2018</a:t>
+              <a:t>11/12/2018</a:t>
             </a:fld>
             <a:endParaRPr lang="en-US"/>
           </a:p>
@@ -1000,7 +1000,7 @@
           <a:p>
             <a:fld id="{78C97017-6FC3-485B-9764-EAC9E56C1D49}" type="datetimeFigureOut">
               <a:rPr lang="en-US" smtClean="0"/>
-              <a:t>10/30/2018</a:t>
+              <a:t>11/12/2018</a:t>
             </a:fld>
             <a:endParaRPr lang="en-US"/>
           </a:p>
@@ -1168,7 +1168,7 @@
           <a:p>
             <a:fld id="{78C97017-6FC3-485B-9764-EAC9E56C1D49}" type="datetimeFigureOut">
               <a:rPr lang="en-US" smtClean="0"/>
-              <a:t>10/30/2018</a:t>
+              <a:t>11/12/2018</a:t>
             </a:fld>
             <a:endParaRPr lang="en-US"/>
           </a:p>
@@ -1413,7 +1413,7 @@
           <a:p>
             <a:fld id="{78C97017-6FC3-485B-9764-EAC9E56C1D49}" type="datetimeFigureOut">
               <a:rPr lang="en-US" smtClean="0"/>
-              <a:t>10/30/2018</a:t>
+              <a:t>11/12/2018</a:t>
             </a:fld>
             <a:endParaRPr lang="en-US"/>
           </a:p>
@@ -1698,7 +1698,7 @@
           <a:p>
             <a:fld id="{78C97017-6FC3-485B-9764-EAC9E56C1D49}" type="datetimeFigureOut">
               <a:rPr lang="en-US" smtClean="0"/>
-              <a:t>10/30/2018</a:t>
+              <a:t>11/12/2018</a:t>
             </a:fld>
             <a:endParaRPr lang="en-US"/>
           </a:p>
@@ -2117,7 +2117,7 @@
           <a:p>
             <a:fld id="{78C97017-6FC3-485B-9764-EAC9E56C1D49}" type="datetimeFigureOut">
               <a:rPr lang="en-US" smtClean="0"/>
-              <a:t>10/30/2018</a:t>
+              <a:t>11/12/2018</a:t>
             </a:fld>
             <a:endParaRPr lang="en-US"/>
           </a:p>
@@ -2234,7 +2234,7 @@
           <a:p>
             <a:fld id="{78C97017-6FC3-485B-9764-EAC9E56C1D49}" type="datetimeFigureOut">
               <a:rPr lang="en-US" smtClean="0"/>
-              <a:t>10/30/2018</a:t>
+              <a:t>11/12/2018</a:t>
             </a:fld>
             <a:endParaRPr lang="en-US"/>
           </a:p>
@@ -2329,7 +2329,7 @@
           <a:p>
             <a:fld id="{78C97017-6FC3-485B-9764-EAC9E56C1D49}" type="datetimeFigureOut">
               <a:rPr lang="en-US" smtClean="0"/>
-              <a:t>10/30/2018</a:t>
+              <a:t>11/12/2018</a:t>
             </a:fld>
             <a:endParaRPr lang="en-US"/>
           </a:p>
@@ -2604,7 +2604,7 @@
           <a:p>
             <a:fld id="{78C97017-6FC3-485B-9764-EAC9E56C1D49}" type="datetimeFigureOut">
               <a:rPr lang="en-US" smtClean="0"/>
-              <a:t>10/30/2018</a:t>
+              <a:t>11/12/2018</a:t>
             </a:fld>
             <a:endParaRPr lang="en-US"/>
           </a:p>
@@ -2856,7 +2856,7 @@
           <a:p>
             <a:fld id="{78C97017-6FC3-485B-9764-EAC9E56C1D49}" type="datetimeFigureOut">
               <a:rPr lang="en-US" smtClean="0"/>
-              <a:t>10/30/2018</a:t>
+              <a:t>11/12/2018</a:t>
             </a:fld>
             <a:endParaRPr lang="en-US"/>
           </a:p>
@@ -3067,7 +3067,7 @@
           <a:p>
             <a:fld id="{78C97017-6FC3-485B-9764-EAC9E56C1D49}" type="datetimeFigureOut">
               <a:rPr lang="en-US" smtClean="0"/>
-              <a:t>10/30/2018</a:t>
+              <a:t>11/12/2018</a:t>
             </a:fld>
             <a:endParaRPr lang="en-US"/>
           </a:p>
@@ -3450,8 +3450,8 @@
         </p:nvSpPr>
         <p:spPr>
           <a:xfrm>
-            <a:off x="636132" y="1828800"/>
-            <a:ext cx="7871735" cy="1972620"/>
+            <a:off x="179294" y="1828800"/>
+            <a:ext cx="8888506" cy="1972620"/>
           </a:xfrm>
           <a:prstGeom prst="roundRect">
             <a:avLst>
@@ -3515,7 +3515,7 @@
         </p:nvSpPr>
         <p:spPr>
           <a:xfrm>
-            <a:off x="2393447" y="2900858"/>
+            <a:off x="1936609" y="2900858"/>
             <a:ext cx="1323049" cy="346760"/>
           </a:xfrm>
           <a:prstGeom prst="rect">
@@ -3593,7 +3593,7 @@
         </p:nvSpPr>
         <p:spPr>
           <a:xfrm rot="16200000">
-            <a:off x="1200230" y="2611105"/>
+            <a:off x="743392" y="2611105"/>
             <a:ext cx="1093635" cy="346760"/>
           </a:xfrm>
           <a:prstGeom prst="rect">
@@ -3656,7 +3656,7 @@
         </p:nvSpPr>
         <p:spPr>
           <a:xfrm rot="16200000">
-            <a:off x="472469" y="2603620"/>
+            <a:off x="15631" y="2603620"/>
             <a:ext cx="1093635" cy="346760"/>
           </a:xfrm>
           <a:prstGeom prst="rect">
@@ -3730,7 +3730,7 @@
         </p:nvSpPr>
         <p:spPr>
           <a:xfrm rot="16200000">
-            <a:off x="1143177" y="2694709"/>
+            <a:off x="686339" y="2694709"/>
             <a:ext cx="270504" cy="175523"/>
           </a:xfrm>
           <a:prstGeom prst="triangle">
@@ -3788,7 +3788,7 @@
         </p:nvCxnSpPr>
         <p:spPr>
           <a:xfrm>
-            <a:off x="2172637" y="3068954"/>
+            <a:off x="1715799" y="3068954"/>
             <a:ext cx="220810" cy="5284"/>
           </a:xfrm>
           <a:prstGeom prst="straightConnector1">
@@ -3828,7 +3828,7 @@
         </p:nvCxnSpPr>
         <p:spPr>
           <a:xfrm>
-            <a:off x="426358" y="2782471"/>
+            <a:off x="-30480" y="2782471"/>
             <a:ext cx="419548" cy="2860"/>
           </a:xfrm>
           <a:prstGeom prst="bentConnector3">
@@ -3873,7 +3873,7 @@
         </p:nvCxnSpPr>
         <p:spPr>
           <a:xfrm flipV="1">
-            <a:off x="1366191" y="2782470"/>
+            <a:off x="909353" y="2782470"/>
             <a:ext cx="216105" cy="1"/>
           </a:xfrm>
           <a:prstGeom prst="line">
@@ -3914,7 +3914,7 @@
         </p:nvSpPr>
         <p:spPr>
           <a:xfrm>
-            <a:off x="1936589" y="2982264"/>
+            <a:off x="1479751" y="2982264"/>
             <a:ext cx="236048" cy="173380"/>
           </a:xfrm>
           <a:prstGeom prst="flowChartDecision">
@@ -3961,6 +3961,7 @@
         <p:nvCxnSpPr>
           <p:cNvPr id="97" name="Elbow Connector 63"/>
           <p:cNvCxnSpPr>
+            <a:cxnSpLocks/>
             <a:stCxn id="99" idx="3"/>
             <a:endCxn id="50" idx="1"/>
           </p:cNvCxnSpPr>
@@ -3968,8 +3969,8 @@
         </p:nvCxnSpPr>
         <p:spPr>
           <a:xfrm flipV="1">
-            <a:off x="3914308" y="3074238"/>
-            <a:ext cx="223324" cy="1"/>
+            <a:off x="3457470" y="3068954"/>
+            <a:ext cx="154889" cy="5285"/>
           </a:xfrm>
           <a:prstGeom prst="bentConnector3">
             <a:avLst>
@@ -4011,7 +4012,7 @@
         </p:nvSpPr>
         <p:spPr>
           <a:xfrm rot="5400000" flipV="1">
-            <a:off x="3691294" y="2986477"/>
+            <a:off x="3234456" y="2986477"/>
             <a:ext cx="270504" cy="175523"/>
           </a:xfrm>
           <a:prstGeom prst="triangle">
@@ -4062,15 +4063,16 @@
         <p:nvCxnSpPr>
           <p:cNvPr id="124" name="Elbow Connector 122"/>
           <p:cNvCxnSpPr>
+            <a:cxnSpLocks/>
             <a:stCxn id="50" idx="3"/>
             <a:endCxn id="66" idx="1"/>
           </p:cNvCxnSpPr>
           <p:nvPr/>
         </p:nvCxnSpPr>
         <p:spPr>
-          <a:xfrm>
-            <a:off x="5307467" y="3074238"/>
-            <a:ext cx="228600" cy="1970"/>
+          <a:xfrm flipV="1">
+            <a:off x="4692591" y="3062805"/>
+            <a:ext cx="196696" cy="6149"/>
           </a:xfrm>
           <a:prstGeom prst="bentConnector3">
             <a:avLst>
@@ -4112,8 +4114,8 @@
         </p:nvSpPr>
         <p:spPr>
           <a:xfrm>
-            <a:off x="4137632" y="2900858"/>
-            <a:ext cx="1169835" cy="346760"/>
+            <a:off x="3612359" y="2895574"/>
+            <a:ext cx="1080232" cy="346760"/>
           </a:xfrm>
           <a:prstGeom prst="rect">
             <a:avLst/>
@@ -4187,7 +4189,7 @@
         </p:nvSpPr>
         <p:spPr>
           <a:xfrm>
-            <a:off x="2390210" y="2300458"/>
+            <a:off x="1933372" y="2300458"/>
             <a:ext cx="1323049" cy="346760"/>
           </a:xfrm>
           <a:prstGeom prst="rect">
@@ -4268,7 +4270,7 @@
         </p:nvCxnSpPr>
         <p:spPr>
           <a:xfrm>
-            <a:off x="2169400" y="2468554"/>
+            <a:off x="1712562" y="2468554"/>
             <a:ext cx="220810" cy="5284"/>
           </a:xfrm>
           <a:prstGeom prst="straightConnector1">
@@ -4308,7 +4310,7 @@
         </p:nvSpPr>
         <p:spPr>
           <a:xfrm>
-            <a:off x="1933352" y="2381864"/>
+            <a:off x="1476514" y="2381864"/>
             <a:ext cx="236048" cy="173380"/>
           </a:xfrm>
           <a:prstGeom prst="flowChartDecision">
@@ -4362,8 +4364,8 @@
         </p:nvCxnSpPr>
         <p:spPr>
           <a:xfrm flipV="1">
-            <a:off x="3911071" y="2473838"/>
-            <a:ext cx="223324" cy="1"/>
+            <a:off x="3454233" y="2473838"/>
+            <a:ext cx="161691" cy="1"/>
           </a:xfrm>
           <a:prstGeom prst="bentConnector3">
             <a:avLst>
@@ -4405,7 +4407,7 @@
         </p:nvSpPr>
         <p:spPr>
           <a:xfrm rot="5400000" flipV="1">
-            <a:off x="3688057" y="2386077"/>
+            <a:off x="3231219" y="2386077"/>
             <a:ext cx="270504" cy="175523"/>
           </a:xfrm>
           <a:prstGeom prst="triangle">
@@ -4460,7 +4462,7 @@
         </p:nvSpPr>
         <p:spPr>
           <a:xfrm>
-            <a:off x="4134395" y="2300458"/>
+            <a:off x="3615924" y="2300458"/>
             <a:ext cx="1093635" cy="346760"/>
           </a:xfrm>
           <a:prstGeom prst="rect">
@@ -4538,7 +4540,7 @@
         </p:nvSpPr>
         <p:spPr>
           <a:xfrm>
-            <a:off x="5536067" y="2902828"/>
+            <a:off x="4889287" y="2889425"/>
             <a:ext cx="1200707" cy="346760"/>
           </a:xfrm>
           <a:prstGeom prst="rect">
@@ -4609,20 +4611,19 @@
         <p:nvCxnSpPr>
           <p:cNvPr id="70" name="Elbow Connector 122"/>
           <p:cNvCxnSpPr>
-            <a:stCxn id="74" idx="0"/>
+            <a:cxnSpLocks/>
+            <a:stCxn id="74" idx="3"/>
             <a:endCxn id="73" idx="2"/>
           </p:cNvCxnSpPr>
           <p:nvPr/>
         </p:nvCxnSpPr>
         <p:spPr>
-          <a:xfrm rot="5400000" flipH="1" flipV="1">
-            <a:off x="7594260" y="2734438"/>
-            <a:ext cx="335208" cy="12700"/>
-          </a:xfrm>
-          <a:prstGeom prst="bentConnector3">
-            <a:avLst>
-              <a:gd name="adj1" fmla="val 50000"/>
-            </a:avLst>
+          <a:xfrm flipV="1">
+            <a:off x="7649537" y="2300458"/>
+            <a:ext cx="710803" cy="369982"/>
+          </a:xfrm>
+          <a:prstGeom prst="bentConnector2">
+            <a:avLst/>
           </a:prstGeom>
           <a:ln w="19050">
             <a:prstDash val="sysDot"/>
@@ -4654,7 +4655,7 @@
         </p:nvSpPr>
         <p:spPr>
           <a:xfrm>
-            <a:off x="7132005" y="2220074"/>
+            <a:off x="7730481" y="1953698"/>
             <a:ext cx="1259718" cy="346760"/>
           </a:xfrm>
           <a:prstGeom prst="rect">
@@ -4710,7 +4711,7 @@
         </p:nvSpPr>
         <p:spPr>
           <a:xfrm>
-            <a:off x="7132005" y="2902042"/>
+            <a:off x="6389819" y="2497060"/>
             <a:ext cx="1259718" cy="346760"/>
           </a:xfrm>
           <a:prstGeom prst="rect">
@@ -4769,8 +4770,8 @@
         </p:nvCxnSpPr>
         <p:spPr>
           <a:xfrm flipV="1">
-            <a:off x="6736774" y="3075422"/>
-            <a:ext cx="395231" cy="786"/>
+            <a:off x="6089994" y="2670440"/>
+            <a:ext cx="299825" cy="392365"/>
           </a:xfrm>
           <a:prstGeom prst="bentConnector3">
             <a:avLst>
@@ -4813,7 +4814,7 @@
         </p:nvSpPr>
         <p:spPr>
           <a:xfrm>
-            <a:off x="7125655" y="3313527"/>
+            <a:off x="6389819" y="2899952"/>
             <a:ext cx="1259718" cy="346760"/>
           </a:xfrm>
           <a:prstGeom prst="rect">
@@ -4879,13 +4880,277 @@
         </p:nvCxnSpPr>
         <p:spPr>
           <a:xfrm>
-            <a:off x="6736774" y="3076208"/>
-            <a:ext cx="388881" cy="410699"/>
+            <a:off x="6089994" y="3062805"/>
+            <a:ext cx="299825" cy="10527"/>
           </a:xfrm>
           <a:prstGeom prst="bentConnector3">
             <a:avLst>
               <a:gd name="adj1" fmla="val 50000"/>
             </a:avLst>
+          </a:prstGeom>
+          <a:ln w="19050">
+            <a:prstDash val="sysDot"/>
+            <a:headEnd type="none" w="med" len="med"/>
+            <a:tailEnd type="arrow" w="med" len="med"/>
+          </a:ln>
+          <a:effectLst/>
+        </p:spPr>
+        <p:style>
+          <a:lnRef idx="1">
+            <a:schemeClr val="accent6"/>
+          </a:lnRef>
+          <a:fillRef idx="2">
+            <a:schemeClr val="accent6"/>
+          </a:fillRef>
+          <a:effectRef idx="1">
+            <a:schemeClr val="accent6"/>
+          </a:effectRef>
+          <a:fontRef idx="minor">
+            <a:schemeClr val="dk1"/>
+          </a:fontRef>
+        </p:style>
+      </p:cxnSp>
+      <p:sp>
+        <p:nvSpPr>
+          <p:cNvPr id="32" name="Rectangle 8">
+            <a:extLst>
+              <a:ext uri="{FF2B5EF4-FFF2-40B4-BE49-F238E27FC236}">
+                <a16:creationId xmlns:a16="http://schemas.microsoft.com/office/drawing/2014/main" id="{4D445E48-5AFA-4D7C-AC45-B8BEE0234AB2}"/>
+              </a:ext>
+            </a:extLst>
+          </p:cNvPr>
+          <p:cNvSpPr/>
+          <p:nvPr/>
+        </p:nvSpPr>
+        <p:spPr>
+          <a:xfrm>
+            <a:off x="6389819" y="3316644"/>
+            <a:ext cx="1259718" cy="346760"/>
+          </a:xfrm>
+          <a:prstGeom prst="rect">
+            <a:avLst/>
+          </a:prstGeom>
+          <a:ln w="19050"/>
+          <a:effectLst/>
+        </p:spPr>
+        <p:style>
+          <a:lnRef idx="1">
+            <a:schemeClr val="accent6"/>
+          </a:lnRef>
+          <a:fillRef idx="2">
+            <a:schemeClr val="accent6"/>
+          </a:fillRef>
+          <a:effectRef idx="1">
+            <a:schemeClr val="accent6"/>
+          </a:effectRef>
+          <a:fontRef idx="minor">
+            <a:schemeClr val="dk1"/>
+          </a:fontRef>
+        </p:style>
+        <p:txBody>
+          <a:bodyPr rtlCol="0" anchor="ctr"/>
+          <a:lstStyle/>
+          <a:p>
+            <a:pPr algn="ctr"/>
+            <a:r>
+              <a:rPr lang="en-US" sz="1050" b="1" dirty="0" err="1">
+                <a:solidFill>
+                  <a:schemeClr val="accent6">
+                    <a:lumMod val="75000"/>
+                  </a:schemeClr>
+                </a:solidFill>
+              </a:rPr>
+              <a:t>XmlAdaptedLoanIdManager</a:t>
+            </a:r>
+            <a:endParaRPr lang="en-SG" sz="1050" b="1" dirty="0">
+              <a:solidFill>
+                <a:schemeClr val="accent6">
+                  <a:lumMod val="75000"/>
+                </a:schemeClr>
+              </a:solidFill>
+            </a:endParaRPr>
+          </a:p>
+        </p:txBody>
+      </p:sp>
+      <p:cxnSp>
+        <p:nvCxnSpPr>
+          <p:cNvPr id="40" name="Elbow Connector 122">
+            <a:extLst>
+              <a:ext uri="{FF2B5EF4-FFF2-40B4-BE49-F238E27FC236}">
+                <a16:creationId xmlns:a16="http://schemas.microsoft.com/office/drawing/2014/main" id="{78F4CE95-DED0-49D3-B1C1-C47579EED881}"/>
+              </a:ext>
+            </a:extLst>
+          </p:cNvPr>
+          <p:cNvCxnSpPr>
+            <a:cxnSpLocks/>
+            <a:stCxn id="66" idx="3"/>
+            <a:endCxn id="32" idx="1"/>
+          </p:cNvCxnSpPr>
+          <p:nvPr/>
+        </p:nvCxnSpPr>
+        <p:spPr>
+          <a:xfrm>
+            <a:off x="6089994" y="3062805"/>
+            <a:ext cx="299825" cy="427219"/>
+          </a:xfrm>
+          <a:prstGeom prst="bentConnector3">
+            <a:avLst>
+              <a:gd name="adj1" fmla="val 50000"/>
+            </a:avLst>
+          </a:prstGeom>
+          <a:ln w="19050">
+            <a:prstDash val="sysDot"/>
+            <a:headEnd type="none" w="med" len="med"/>
+            <a:tailEnd type="arrow" w="med" len="med"/>
+          </a:ln>
+          <a:effectLst/>
+        </p:spPr>
+        <p:style>
+          <a:lnRef idx="1">
+            <a:schemeClr val="accent6"/>
+          </a:lnRef>
+          <a:fillRef idx="2">
+            <a:schemeClr val="accent6"/>
+          </a:fillRef>
+          <a:effectRef idx="1">
+            <a:schemeClr val="accent6"/>
+          </a:effectRef>
+          <a:fontRef idx="minor">
+            <a:schemeClr val="dk1"/>
+          </a:fontRef>
+        </p:style>
+      </p:cxnSp>
+      <p:sp>
+        <p:nvSpPr>
+          <p:cNvPr id="62" name="Rectangle 8">
+            <a:extLst>
+              <a:ext uri="{FF2B5EF4-FFF2-40B4-BE49-F238E27FC236}">
+                <a16:creationId xmlns:a16="http://schemas.microsoft.com/office/drawing/2014/main" id="{C4F1E4F5-13C9-479B-AA5E-1632DBCEB7DA}"/>
+              </a:ext>
+            </a:extLst>
+          </p:cNvPr>
+          <p:cNvSpPr/>
+          <p:nvPr/>
+        </p:nvSpPr>
+        <p:spPr>
+          <a:xfrm>
+            <a:off x="7730481" y="2899952"/>
+            <a:ext cx="1259718" cy="346760"/>
+          </a:xfrm>
+          <a:prstGeom prst="rect">
+            <a:avLst/>
+          </a:prstGeom>
+          <a:ln w="19050"/>
+          <a:effectLst/>
+        </p:spPr>
+        <p:style>
+          <a:lnRef idx="1">
+            <a:schemeClr val="accent6"/>
+          </a:lnRef>
+          <a:fillRef idx="2">
+            <a:schemeClr val="accent6"/>
+          </a:fillRef>
+          <a:effectRef idx="1">
+            <a:schemeClr val="accent6"/>
+          </a:effectRef>
+          <a:fontRef idx="minor">
+            <a:schemeClr val="dk1"/>
+          </a:fontRef>
+        </p:style>
+        <p:txBody>
+          <a:bodyPr rtlCol="0" anchor="ctr"/>
+          <a:lstStyle/>
+          <a:p>
+            <a:pPr algn="ctr"/>
+            <a:r>
+              <a:rPr lang="en-US" sz="1050" b="1" dirty="0" err="1">
+                <a:solidFill>
+                  <a:schemeClr val="accent6">
+                    <a:lumMod val="75000"/>
+                  </a:schemeClr>
+                </a:solidFill>
+              </a:rPr>
+              <a:t>XmlAdaptedLoanId</a:t>
+            </a:r>
+            <a:endParaRPr lang="en-SG" sz="1050" b="1" dirty="0">
+              <a:solidFill>
+                <a:schemeClr val="accent6">
+                  <a:lumMod val="75000"/>
+                </a:schemeClr>
+              </a:solidFill>
+            </a:endParaRPr>
+          </a:p>
+        </p:txBody>
+      </p:sp>
+      <p:cxnSp>
+        <p:nvCxnSpPr>
+          <p:cNvPr id="63" name="Elbow Connector 122">
+            <a:extLst>
+              <a:ext uri="{FF2B5EF4-FFF2-40B4-BE49-F238E27FC236}">
+                <a16:creationId xmlns:a16="http://schemas.microsoft.com/office/drawing/2014/main" id="{B8FB53EF-482C-49D5-A9F6-9B66D517B21F}"/>
+              </a:ext>
+            </a:extLst>
+          </p:cNvPr>
+          <p:cNvCxnSpPr>
+            <a:cxnSpLocks/>
+            <a:stCxn id="74" idx="3"/>
+            <a:endCxn id="62" idx="0"/>
+          </p:cNvCxnSpPr>
+          <p:nvPr/>
+        </p:nvCxnSpPr>
+        <p:spPr>
+          <a:xfrm>
+            <a:off x="7649537" y="2670440"/>
+            <a:ext cx="710803" cy="229512"/>
+          </a:xfrm>
+          <a:prstGeom prst="bentConnector2">
+            <a:avLst/>
+          </a:prstGeom>
+          <a:ln w="19050">
+            <a:prstDash val="sysDot"/>
+            <a:headEnd type="none" w="med" len="med"/>
+            <a:tailEnd type="arrow" w="med" len="med"/>
+          </a:ln>
+          <a:effectLst/>
+        </p:spPr>
+        <p:style>
+          <a:lnRef idx="1">
+            <a:schemeClr val="accent6"/>
+          </a:lnRef>
+          <a:fillRef idx="2">
+            <a:schemeClr val="accent6"/>
+          </a:fillRef>
+          <a:effectRef idx="1">
+            <a:schemeClr val="accent6"/>
+          </a:effectRef>
+          <a:fontRef idx="minor">
+            <a:schemeClr val="dk1"/>
+          </a:fontRef>
+        </p:style>
+      </p:cxnSp>
+      <p:cxnSp>
+        <p:nvCxnSpPr>
+          <p:cNvPr id="67" name="Elbow Connector 122">
+            <a:extLst>
+              <a:ext uri="{FF2B5EF4-FFF2-40B4-BE49-F238E27FC236}">
+                <a16:creationId xmlns:a16="http://schemas.microsoft.com/office/drawing/2014/main" id="{031DB388-11E3-4DD1-B4F1-1ECBB5841C8F}"/>
+              </a:ext>
+            </a:extLst>
+          </p:cNvPr>
+          <p:cNvCxnSpPr>
+            <a:cxnSpLocks/>
+            <a:stCxn id="32" idx="3"/>
+            <a:endCxn id="62" idx="2"/>
+          </p:cNvCxnSpPr>
+          <p:nvPr/>
+        </p:nvCxnSpPr>
+        <p:spPr>
+          <a:xfrm flipV="1">
+            <a:off x="7649537" y="3246712"/>
+            <a:ext cx="710803" cy="243312"/>
+          </a:xfrm>
+          <a:prstGeom prst="bentConnector2">
+            <a:avLst/>
           </a:prstGeom>
           <a:ln w="19050">
             <a:prstDash val="sysDot"/>

</xml_diff>